<commit_message>
Added stuff for week2, tues...
</commit_message>
<xml_diff>
--- a/slides/week1_thurs.pptx
+++ b/slides/week1_thurs.pptx
@@ -5,10 +5,10 @@
     <p:sldMasterId id="2147483648" r:id="rId1"/>
   </p:sldMasterIdLst>
   <p:notesMasterIdLst>
-    <p:notesMasterId r:id="rId15"/>
+    <p:notesMasterId r:id="rId16"/>
   </p:notesMasterIdLst>
   <p:handoutMasterIdLst>
-    <p:handoutMasterId r:id="rId16"/>
+    <p:handoutMasterId r:id="rId17"/>
   </p:handoutMasterIdLst>
   <p:sldIdLst>
     <p:sldId id="262" r:id="rId2"/>
@@ -24,6 +24,7 @@
     <p:sldId id="278" r:id="rId12"/>
     <p:sldId id="279" r:id="rId13"/>
     <p:sldId id="280" r:id="rId14"/>
+    <p:sldId id="281" r:id="rId15"/>
   </p:sldIdLst>
   <p:sldSz cx="9144000" cy="6858000" type="screen4x3"/>
   <p:notesSz cx="6858000" cy="9144000"/>
@@ -4233,6 +4234,13 @@
   <p:clrMapOvr>
     <a:masterClrMapping/>
   </p:clrMapOvr>
+  <p:timing>
+    <p:tnLst>
+      <p:par>
+        <p:cTn id="1" dur="indefinite" restart="never" nodeType="tmRoot"/>
+      </p:par>
+    </p:tnLst>
+  </p:timing>
 </p:sld>
 </file>
 
@@ -4690,6 +4698,13 @@
   <p:clrMapOvr>
     <a:masterClrMapping/>
   </p:clrMapOvr>
+  <p:timing>
+    <p:tnLst>
+      <p:par>
+        <p:cTn id="1" dur="indefinite" restart="never" nodeType="tmRoot"/>
+      </p:par>
+    </p:tnLst>
+  </p:timing>
 </p:sld>
 </file>
 
@@ -5069,6 +5084,13 @@
   <p:clrMapOvr>
     <a:masterClrMapping/>
   </p:clrMapOvr>
+  <p:timing>
+    <p:tnLst>
+      <p:par>
+        <p:cTn id="1" dur="indefinite" restart="never" nodeType="tmRoot"/>
+      </p:par>
+    </p:tnLst>
+  </p:timing>
 </p:sld>
 </file>
 
@@ -5561,6 +5583,83 @@
   <p:clrMapOvr>
     <a:masterClrMapping/>
   </p:clrMapOvr>
+  <p:timing>
+    <p:tnLst>
+      <p:par>
+        <p:cTn id="1" dur="indefinite" restart="never" nodeType="tmRoot"/>
+      </p:par>
+    </p:tnLst>
+  </p:timing>
+</p:sld>
+</file>
+
+<file path=ppt/slides/slide14.xml><?xml version="1.0" encoding="utf-8"?>
+<p:sld xmlns:a="http://schemas.openxmlformats.org/drawingml/2006/main" xmlns:r="http://schemas.openxmlformats.org/officeDocument/2006/relationships" xmlns:mc="http://schemas.openxmlformats.org/markup-compatibility/2006" xmlns:mv="urn:schemas-microsoft-com:mac:vml" xmlns:p="http://schemas.openxmlformats.org/presentationml/2006/main" mc:Ignorable="mv" mc:PreserveAttributes="mv:*">
+  <p:cSld>
+    <p:spTree>
+      <p:nvGrpSpPr>
+        <p:cNvPr id="1" name=""/>
+        <p:cNvGrpSpPr/>
+        <p:nvPr/>
+      </p:nvGrpSpPr>
+      <p:grpSpPr>
+        <a:xfrm>
+          <a:off x="0" y="0"/>
+          <a:ext cx="0" cy="0"/>
+          <a:chOff x="0" y="0"/>
+          <a:chExt cx="0" cy="0"/>
+        </a:xfrm>
+      </p:grpSpPr>
+      <p:sp>
+        <p:nvSpPr>
+          <p:cNvPr id="2" name="Title 1"/>
+          <p:cNvSpPr>
+            <a:spLocks noGrp="1"/>
+          </p:cNvSpPr>
+          <p:nvPr>
+            <p:ph type="title"/>
+          </p:nvPr>
+        </p:nvSpPr>
+        <p:spPr/>
+        <p:txBody>
+          <a:bodyPr/>
+          <a:lstStyle/>
+          <a:p>
+            <a:endParaRPr lang="en-US"/>
+          </a:p>
+        </p:txBody>
+      </p:sp>
+      <p:sp>
+        <p:nvSpPr>
+          <p:cNvPr id="3" name="Content Placeholder 2"/>
+          <p:cNvSpPr>
+            <a:spLocks noGrp="1"/>
+          </p:cNvSpPr>
+          <p:nvPr>
+            <p:ph idx="1"/>
+          </p:nvPr>
+        </p:nvSpPr>
+        <p:spPr/>
+        <p:txBody>
+          <a:bodyPr/>
+          <a:lstStyle/>
+          <a:p>
+            <a:endParaRPr lang="en-US"/>
+          </a:p>
+        </p:txBody>
+      </p:sp>
+    </p:spTree>
+  </p:cSld>
+  <p:clrMapOvr>
+    <a:masterClrMapping/>
+  </p:clrMapOvr>
+  <p:timing>
+    <p:tnLst>
+      <p:par>
+        <p:cTn id="1" dur="indefinite" restart="never" nodeType="tmRoot"/>
+      </p:par>
+    </p:tnLst>
+  </p:timing>
 </p:sld>
 </file>
 
@@ -6611,6 +6710,13 @@
   <p:clrMapOvr>
     <a:masterClrMapping/>
   </p:clrMapOvr>
+  <p:timing>
+    <p:tnLst>
+      <p:par>
+        <p:cTn id="1" dur="indefinite" restart="never" nodeType="tmRoot"/>
+      </p:par>
+    </p:tnLst>
+  </p:timing>
 </p:sld>
 </file>
 
@@ -6989,6 +7095,13 @@
   <p:clrMapOvr>
     <a:masterClrMapping/>
   </p:clrMapOvr>
+  <p:timing>
+    <p:tnLst>
+      <p:par>
+        <p:cTn id="1" dur="indefinite" restart="never" nodeType="tmRoot"/>
+      </p:par>
+    </p:tnLst>
+  </p:timing>
 </p:sld>
 </file>
 
@@ -7111,6 +7224,13 @@
   <p:clrMapOvr>
     <a:masterClrMapping/>
   </p:clrMapOvr>
+  <p:timing>
+    <p:tnLst>
+      <p:par>
+        <p:cTn id="1" dur="indefinite" restart="never" nodeType="tmRoot"/>
+      </p:par>
+    </p:tnLst>
+  </p:timing>
 </p:sld>
 </file>
 
@@ -7354,6 +7474,13 @@
   <p:clrMapOvr>
     <a:masterClrMapping/>
   </p:clrMapOvr>
+  <p:timing>
+    <p:tnLst>
+      <p:par>
+        <p:cTn id="1" dur="indefinite" restart="never" nodeType="tmRoot"/>
+      </p:par>
+    </p:tnLst>
+  </p:timing>
 </p:sld>
 </file>
 

</xml_diff>